<commit_message>
Small changes in the readme and presentation part2
</commit_message>
<xml_diff>
--- a/intro-psychopy/part2.pptx
+++ b/intro-psychopy/part2.pptx
@@ -8,7 +8,7 @@
     <p:notesMasterId r:id="rId22"/>
   </p:notesMasterIdLst>
   <p:sldIdLst>
-    <p:sldId id="256" r:id="rId2"/>
+    <p:sldId id="276" r:id="rId2"/>
     <p:sldId id="257" r:id="rId3"/>
     <p:sldId id="258" r:id="rId4"/>
     <p:sldId id="259" r:id="rId5"/>
@@ -2731,68 +2731,85 @@
       </p:grpSpPr>
       <p:sp>
         <p:nvSpPr>
-          <p:cNvPr id="94" name="Title 1"/>
-          <p:cNvSpPr txBox="1">
+          <p:cNvPr id="2" name="Title 1"/>
+          <p:cNvSpPr>
             <a:spLocks noGrp="1"/>
           </p:cNvSpPr>
           <p:nvPr>
             <p:ph type="ctrTitle"/>
           </p:nvPr>
         </p:nvSpPr>
-        <p:spPr>
-          <a:prstGeom prst="rect">
-            <a:avLst/>
-          </a:prstGeom>
-        </p:spPr>
+        <p:spPr/>
         <p:txBody>
           <a:bodyPr/>
           <a:lstStyle/>
           <a:p>
             <a:r>
-              <a:t>Introduction to PsychoPy</a:t>
-            </a:r>
+              <a:rPr lang="en-US" b="1" dirty="0" smtClean="0"/>
+              <a:t>Introduction to </a:t>
+            </a:r>
+            <a:r>
+              <a:rPr lang="en-US" b="1" dirty="0" err="1" smtClean="0"/>
+              <a:t>PsychoPy</a:t>
+            </a:r>
+            <a:endParaRPr lang="en-US" b="1" dirty="0"/>
           </a:p>
         </p:txBody>
       </p:sp>
       <p:sp>
         <p:nvSpPr>
-          <p:cNvPr id="95" name="Subtitle 2"/>
-          <p:cNvSpPr txBox="1">
+          <p:cNvPr id="3" name="Subtitle 2"/>
+          <p:cNvSpPr>
             <a:spLocks noGrp="1"/>
           </p:cNvSpPr>
           <p:nvPr>
-            <p:ph type="subTitle" sz="quarter" idx="1"/>
+            <p:ph type="subTitle" idx="1"/>
           </p:nvPr>
         </p:nvSpPr>
         <p:spPr>
           <a:xfrm>
             <a:off x="1524000" y="3602037"/>
-            <a:ext cx="9144000" cy="1655762"/>
+            <a:ext cx="9144000" cy="2590215"/>
           </a:xfrm>
-          <a:prstGeom prst="rect">
-            <a:avLst/>
-          </a:prstGeom>
         </p:spPr>
         <p:txBody>
-          <a:bodyPr/>
+          <a:bodyPr>
+            <a:normAutofit/>
+          </a:bodyPr>
           <a:lstStyle/>
           <a:p>
-            <a:pPr>
-              <a:defRPr b="1"/>
-            </a:pPr>
-            <a:endParaRPr/>
-          </a:p>
-          <a:p>
-            <a:pPr>
-              <a:defRPr b="1"/>
-            </a:pPr>
-            <a:r>
-              <a:t>Part 2: Introduction to Python</a:t>
-            </a:r>
+            <a:endParaRPr lang="en-US" b="1" dirty="0" smtClean="0"/>
+          </a:p>
+          <a:p>
+            <a:r>
+              <a:rPr lang="en-US" b="1" dirty="0" smtClean="0"/>
+              <a:t>Part </a:t>
+            </a:r>
+            <a:r>
+              <a:rPr lang="en-US" b="1" dirty="0" smtClean="0"/>
+              <a:t>2: </a:t>
+            </a:r>
+            <a:r>
+              <a:rPr lang="en-US" b="1" dirty="0"/>
+              <a:t>Introduction to </a:t>
+            </a:r>
+            <a:r>
+              <a:rPr lang="en-US" b="1" dirty="0" err="1" smtClean="0"/>
+              <a:t>PsychoPy</a:t>
+            </a:r>
+            <a:endParaRPr lang="en-US" b="1" dirty="0" smtClean="0"/>
+          </a:p>
+          <a:p>
+            <a:endParaRPr lang="en-US" b="1" dirty="0"/>
           </a:p>
         </p:txBody>
       </p:sp>
     </p:spTree>
+    <p:extLst>
+      <p:ext uri="{BB962C8B-B14F-4D97-AF65-F5344CB8AC3E}">
+        <p14:creationId xmlns:p14="http://schemas.microsoft.com/office/powerpoint/2010/main" val="1819366488"/>
+      </p:ext>
+    </p:extLst>
   </p:cSld>
   <p:clrMapOvr>
     <a:masterClrMapping/>
@@ -2838,6 +2855,7 @@
           <a:lstStyle/>
           <a:p>
             <a:r>
+              <a:rPr b="1" dirty="0"/>
               <a:t>Creating Sound Stimuli</a:t>
             </a:r>
           </a:p>
@@ -3424,6 +3442,7 @@
           <a:lstStyle/>
           <a:p>
             <a:r>
+              <a:rPr b="1" dirty="0"/>
               <a:t>Creating Video Stimuli</a:t>
             </a:r>
           </a:p>
@@ -5239,6 +5258,7 @@
           <a:lstStyle/>
           <a:p>
             <a:r>
+              <a:rPr b="1" dirty="0"/>
               <a:t>Response Collection</a:t>
             </a:r>
           </a:p>
@@ -6019,6 +6039,7 @@
           <a:lstStyle/>
           <a:p>
             <a:r>
+              <a:rPr b="1" dirty="0"/>
               <a:t>Response Collection Example</a:t>
             </a:r>
           </a:p>
@@ -6963,6 +6984,7 @@
           <a:lstStyle/>
           <a:p>
             <a:r>
+              <a:rPr b="1" dirty="0"/>
               <a:t>Data Collection</a:t>
             </a:r>
           </a:p>
@@ -7037,6 +7059,7 @@
           <a:lstStyle/>
           <a:p>
             <a:r>
+              <a:rPr b="1" dirty="0"/>
               <a:t>Logging Data</a:t>
             </a:r>
           </a:p>
@@ -7141,6 +7164,7 @@
           <a:lstStyle/>
           <a:p>
             <a:r>
+              <a:rPr b="1" dirty="0"/>
               <a:t>Logging in CSV format</a:t>
             </a:r>
           </a:p>
@@ -7225,15 +7249,17 @@
               <a:defRPr sz="2000" b="1"/>
             </a:pPr>
             <a:r>
+              <a:rPr dirty="0"/>
               <a:t>Tip!</a:t>
             </a:r>
           </a:p>
           <a:p>
             <a:r>
+              <a:rPr dirty="0"/>
               <a:t>Change the  </a:t>
             </a:r>
             <a:r>
-              <a:rPr>
+              <a:rPr dirty="0" err="1">
                 <a:solidFill>
                   <a:srgbClr val="9CDCFE"/>
                 </a:solidFill>
@@ -7241,18 +7267,27 @@
               <a:t>exp</a:t>
             </a:r>
             <a:r>
-              <a:rPr>
+              <a:rPr dirty="0" err="1">
                 <a:solidFill>
                   <a:srgbClr val="CCCCCC"/>
                 </a:solidFill>
               </a:rPr>
-              <a:t>.saveAsWideText(</a:t>
-            </a:r>
-            <a:r>
+              <a:t>.saveAsWideText</a:t>
+            </a:r>
+            <a:r>
+              <a:rPr dirty="0">
+                <a:solidFill>
+                  <a:srgbClr val="CCCCCC"/>
+                </a:solidFill>
+              </a:rPr>
+              <a:t>(</a:t>
+            </a:r>
+            <a:r>
+              <a:rPr dirty="0"/>
               <a:t>'experiment_data.csv'</a:t>
             </a:r>
             <a:r>
-              <a:rPr>
+              <a:rPr dirty="0">
                 <a:solidFill>
                   <a:srgbClr val="CCCCCC"/>
                 </a:solidFill>
@@ -7261,7 +7296,7 @@
             </a:r>
           </a:p>
           <a:p>
-            <a:endParaRPr>
+            <a:endParaRPr dirty="0">
               <a:solidFill>
                 <a:srgbClr val="CCCCCC"/>
               </a:solidFill>
@@ -7269,10 +7304,11 @@
           </a:p>
           <a:p>
             <a:r>
+              <a:rPr dirty="0"/>
               <a:t>Line with  </a:t>
             </a:r>
             <a:r>
-              <a:rPr>
+              <a:rPr dirty="0" err="1">
                 <a:solidFill>
                   <a:srgbClr val="9CDCFE"/>
                 </a:solidFill>
@@ -7280,18 +7316,27 @@
               <a:t>exp</a:t>
             </a:r>
             <a:r>
-              <a:rPr>
+              <a:rPr dirty="0" err="1">
                 <a:solidFill>
                   <a:srgbClr val="CCCCCC"/>
                 </a:solidFill>
               </a:rPr>
-              <a:t>.saveAsExcel(</a:t>
-            </a:r>
-            <a:r>
+              <a:t>.saveAsExcel</a:t>
+            </a:r>
+            <a:r>
+              <a:rPr dirty="0">
+                <a:solidFill>
+                  <a:srgbClr val="CCCCCC"/>
+                </a:solidFill>
+              </a:rPr>
+              <a:t>(</a:t>
+            </a:r>
+            <a:r>
+              <a:rPr dirty="0"/>
               <a:t>‘experiment_data.xlsx’</a:t>
             </a:r>
             <a:r>
-              <a:rPr>
+              <a:rPr dirty="0">
                 <a:solidFill>
                   <a:srgbClr val="CCCCCC"/>
                 </a:solidFill>
@@ -7300,7 +7345,7 @@
             </a:r>
           </a:p>
           <a:p>
-            <a:endParaRPr>
+            <a:endParaRPr dirty="0">
               <a:solidFill>
                 <a:srgbClr val="CCCCCC"/>
               </a:solidFill>
@@ -7308,6 +7353,7 @@
           </a:p>
           <a:p>
             <a:r>
+              <a:rPr dirty="0"/>
               <a:t>And save the log file as an Excel file!</a:t>
             </a:r>
           </a:p>
@@ -8103,6 +8149,7 @@
           <a:lstStyle/>
           <a:p>
             <a:r>
+              <a:rPr b="1" dirty="0"/>
               <a:t>Synchronization with External Devices</a:t>
             </a:r>
           </a:p>
@@ -8207,6 +8254,7 @@
           <a:lstStyle/>
           <a:p>
             <a:r>
+              <a:rPr b="1" dirty="0"/>
               <a:t>Builder example</a:t>
             </a:r>
           </a:p>
@@ -8231,7 +8279,43 @@
           <a:bodyPr/>
           <a:lstStyle/>
           <a:p>
-            <a:endParaRPr/>
+            <a:r>
+              <a:rPr lang="en-US" dirty="0"/>
+              <a:t>Move on to the following link to the walkthrough</a:t>
+            </a:r>
+            <a:r>
+              <a:rPr lang="en-US" dirty="0" smtClean="0"/>
+              <a:t>:</a:t>
+            </a:r>
+            <a:endParaRPr lang="en-US" dirty="0" smtClean="0">
+              <a:hlinkClick r:id="rId2"/>
+            </a:endParaRPr>
+          </a:p>
+          <a:p>
+            <a:pPr lvl="1"/>
+            <a:r>
+              <a:rPr lang="en-US" dirty="0" smtClean="0">
+                <a:hlinkClick r:id="rId2"/>
+              </a:rPr>
+              <a:t>https</a:t>
+            </a:r>
+            <a:r>
+              <a:rPr lang="en-US" dirty="0">
+                <a:hlinkClick r:id="rId2"/>
+              </a:rPr>
+              <a:t>://</a:t>
+            </a:r>
+            <a:r>
+              <a:rPr lang="en-US" dirty="0" smtClean="0">
+                <a:hlinkClick r:id="rId2"/>
+              </a:rPr>
+              <a:t>github.com/caggursoy/PsychoPy-Intro-Course/tree/main/scripting/stroop/builder_exp</a:t>
+            </a:r>
+            <a:r>
+              <a:rPr lang="en-US" dirty="0" smtClean="0"/>
+              <a:t> </a:t>
+            </a:r>
+            <a:endParaRPr dirty="0"/>
           </a:p>
         </p:txBody>
       </p:sp>
@@ -8281,6 +8365,7 @@
           <a:lstStyle/>
           <a:p>
             <a:r>
+              <a:rPr b="1" dirty="0"/>
               <a:t>Introduction</a:t>
             </a:r>
           </a:p>
@@ -8441,6 +8526,7 @@
           <a:lstStyle/>
           <a:p>
             <a:r>
+              <a:rPr b="1" dirty="0"/>
               <a:t>Scripting example</a:t>
             </a:r>
           </a:p>
@@ -8465,7 +8551,43 @@
           <a:bodyPr/>
           <a:lstStyle/>
           <a:p>
-            <a:endParaRPr/>
+            <a:r>
+              <a:rPr lang="en-US" dirty="0"/>
+              <a:t>Move on to the following link to the walkthrough</a:t>
+            </a:r>
+            <a:r>
+              <a:rPr lang="en-US" dirty="0" smtClean="0"/>
+              <a:t>:</a:t>
+            </a:r>
+            <a:endParaRPr lang="en-US" dirty="0" smtClean="0">
+              <a:hlinkClick r:id="rId2"/>
+            </a:endParaRPr>
+          </a:p>
+          <a:p>
+            <a:pPr lvl="1"/>
+            <a:r>
+              <a:rPr lang="en-US" dirty="0" smtClean="0">
+                <a:hlinkClick r:id="rId2"/>
+              </a:rPr>
+              <a:t>https</a:t>
+            </a:r>
+            <a:r>
+              <a:rPr lang="en-US" dirty="0">
+                <a:hlinkClick r:id="rId2"/>
+              </a:rPr>
+              <a:t>://</a:t>
+            </a:r>
+            <a:r>
+              <a:rPr lang="en-US" dirty="0" smtClean="0">
+                <a:hlinkClick r:id="rId2"/>
+              </a:rPr>
+              <a:t>github.com/caggursoy/PsychoPy-Intro-Course/tree/main/scripting/stroop/scripting</a:t>
+            </a:r>
+            <a:r>
+              <a:rPr lang="en-US" dirty="0" smtClean="0"/>
+              <a:t> </a:t>
+            </a:r>
+            <a:endParaRPr dirty="0"/>
           </a:p>
         </p:txBody>
       </p:sp>
@@ -8515,7 +8637,16 @@
           <a:lstStyle/>
           <a:p>
             <a:r>
-              <a:t>Overview of PsychoPy and its Capabilities</a:t>
+              <a:rPr b="1" dirty="0"/>
+              <a:t>Overview of </a:t>
+            </a:r>
+            <a:r>
+              <a:rPr b="1" dirty="0" err="1"/>
+              <a:t>PsychoPy</a:t>
+            </a:r>
+            <a:r>
+              <a:rPr b="1" dirty="0"/>
+              <a:t> and its Capabilities</a:t>
             </a:r>
           </a:p>
         </p:txBody>
@@ -8666,6 +8797,7 @@
           <a:lstStyle/>
           <a:p>
             <a:r>
+              <a:rPr b="1" dirty="0"/>
               <a:t>Installation and Setup</a:t>
             </a:r>
           </a:p>
@@ -8691,6 +8823,7 @@
           <a:lstStyle/>
           <a:p>
             <a:r>
+              <a:rPr dirty="0"/>
               <a:t>Move on to the following link to the walkthrough:</a:t>
             </a:r>
           </a:p>
@@ -8702,7 +8835,7 @@
               <a:defRPr sz="2400"/>
             </a:pPr>
             <a:r>
-              <a:rPr u="sng">
+              <a:rPr u="sng" dirty="0">
                 <a:solidFill>
                   <a:srgbClr val="0563C1"/>
                 </a:solidFill>
@@ -8716,6 +8849,7 @@
               <a:t>https://github.com/caggursoy/PsychoPy-Intro-Course/tree/main/conda</a:t>
             </a:r>
             <a:r>
+              <a:rPr dirty="0"/>
               <a:t> </a:t>
             </a:r>
           </a:p>
@@ -8767,6 +8901,7 @@
           <a:lstStyle/>
           <a:p>
             <a:r>
+              <a:rPr b="1" dirty="0"/>
               <a:t>Interface Overview</a:t>
             </a:r>
           </a:p>
@@ -9016,6 +9151,7 @@
           <a:lstStyle/>
           <a:p>
             <a:r>
+              <a:rPr b="1" dirty="0"/>
               <a:t>Stimuli Presentation</a:t>
             </a:r>
           </a:p>
@@ -9090,7 +9226,7 @@
           <a:lstStyle/>
           <a:p>
             <a:r>
-              <a:rPr dirty="0"/>
+              <a:rPr b="1" dirty="0"/>
               <a:t>Creating and Presenting Stimuli</a:t>
             </a:r>
           </a:p>
@@ -9240,6 +9376,7 @@
           <a:lstStyle/>
           <a:p>
             <a:r>
+              <a:rPr b="1" dirty="0"/>
               <a:t>Creating Text Stimuli</a:t>
             </a:r>
           </a:p>
@@ -10003,6 +10140,7 @@
           <a:lstStyle/>
           <a:p>
             <a:r>
+              <a:rPr b="1" dirty="0"/>
               <a:t>Creating Image Stimuli</a:t>
             </a:r>
           </a:p>

</xml_diff>